<commit_message>
Task zum Erreichen der 4.Münze implementiert
</commit_message>
<xml_diff>
--- a/Präsentationen/MSGESR3.pptx
+++ b/Präsentationen/MSGESR3.pptx
@@ -239,7 +239,7 @@
             <a:fld id="{350B7780-B50B-474C-85C6-0B4009B6F014}" type="datetimeFigureOut">
               <a:rPr lang="de-DE" smtClean="0"/>
               <a:pPr/>
-              <a:t>21.01.2016</a:t>
+              <a:t>23.01.2016</a:t>
             </a:fld>
             <a:endParaRPr lang="de-DE"/>
           </a:p>
@@ -406,7 +406,7 @@
             <a:fld id="{19FFB102-D3AF-431C-A902-ADE5B2A48608}" type="datetimeFigureOut">
               <a:rPr lang="de-DE" smtClean="0"/>
               <a:pPr/>
-              <a:t>21.01.2016</a:t>
+              <a:t>23.01.2016</a:t>
             </a:fld>
             <a:endParaRPr lang="de-DE"/>
           </a:p>
@@ -805,7 +805,7 @@
             <a:fld id="{1BA50D42-C9CD-4801-B293-61D1F53EC57E}" type="datetimeFigureOut">
               <a:rPr lang="de-DE" smtClean="0"/>
               <a:pPr/>
-              <a:t>21.01.2016</a:t>
+              <a:t>23.01.2016</a:t>
             </a:fld>
             <a:endParaRPr lang="de-DE"/>
           </a:p>
@@ -2835,7 +2835,7 @@
       </p:sp>
       <p:pic>
         <p:nvPicPr>
-          <p:cNvPr id="4" name="Inhaltsplatzhalter 3"/>
+          <p:cNvPr id="5" name="Inhaltsplatzhalter 4"/>
           <p:cNvPicPr>
             <a:picLocks noGrp="1" noChangeAspect="1"/>
           </p:cNvPicPr>
@@ -2857,12 +2857,9 @@
         </p:blipFill>
         <p:spPr>
           <a:xfrm>
-            <a:off x="2915816" y="2348880"/>
-            <a:ext cx="3619500" cy="3810000"/>
+            <a:off x="1043608" y="2636912"/>
+            <a:ext cx="7200900" cy="2449285"/>
           </a:xfrm>
-          <a:prstGeom prst="rect">
-            <a:avLst/>
-          </a:prstGeom>
         </p:spPr>
       </p:pic>
     </p:spTree>
@@ -3019,11 +3016,7 @@
           <a:p>
             <a:r>
               <a:rPr lang="de-DE" dirty="0" smtClean="0"/>
-              <a:t>		    </a:t>
-            </a:r>
-            <a:r>
-              <a:rPr lang="de-DE" dirty="0" smtClean="0"/>
-              <a:t>Testablauf</a:t>
+              <a:t>		    Testablauf</a:t>
             </a:r>
             <a:endParaRPr lang="de-DE" dirty="0"/>
           </a:p>

</xml_diff>